<commit_message>
fixed some typos fixed image of btree added more literature
</commit_message>
<xml_diff>
--- a/20240530_postgres-indices.pptx
+++ b/20240530_postgres-indices.pptx
@@ -234,7 +234,7 @@
           <a:p>
             <a:fld id="{3DBDF0DE-9B2C-456A-81CE-ECB4922A2D02}" type="datetimeFigureOut">
               <a:rPr lang="de-DE" smtClean="0"/>
-              <a:t>12.06.2024</a:t>
+              <a:t>13.06.2024</a:t>
             </a:fld>
             <a:endParaRPr lang="de-DE"/>
           </a:p>
@@ -399,7 +399,7 @@
           <a:p>
             <a:fld id="{672A31F9-8E4B-4ED6-8272-3FF50063C297}" type="datetimeFigureOut">
               <a:rPr lang="de-DE" smtClean="0"/>
-              <a:t>12.06.2024</a:t>
+              <a:t>13.06.2024</a:t>
             </a:fld>
             <a:endParaRPr lang="de-DE"/>
           </a:p>
@@ -2282,7 +2282,7 @@
         <p:spPr>
           <a:xfrm>
             <a:off x="263352" y="1869943"/>
-            <a:ext cx="8928992" cy="338554"/>
+            <a:ext cx="10729192" cy="338554"/>
           </a:xfrm>
           <a:prstGeom prst="rect">
             <a:avLst/>
@@ -2340,7 +2340,7 @@
         <p:spPr>
           <a:xfrm>
             <a:off x="263352" y="2385635"/>
-            <a:ext cx="8928992" cy="338554"/>
+            <a:ext cx="10729192" cy="338554"/>
           </a:xfrm>
           <a:prstGeom prst="rect">
             <a:avLst/>
@@ -2398,7 +2398,7 @@
         <p:spPr>
           <a:xfrm>
             <a:off x="263352" y="2901327"/>
-            <a:ext cx="8928992" cy="338554"/>
+            <a:ext cx="10729192" cy="338554"/>
           </a:xfrm>
           <a:prstGeom prst="rect">
             <a:avLst/>
@@ -2437,6 +2437,122 @@
             <a:r>
               <a:rPr lang="de-DE" sz="1600" dirty="0"/>
               <a:t>https://www.postgresql.org/docs/current/datatype-json.html</a:t>
+            </a:r>
+          </a:p>
+        </p:txBody>
+      </p:sp>
+      <p:sp>
+        <p:nvSpPr>
+          <p:cNvPr id="2" name="Textfeld 1">
+            <a:extLst>
+              <a:ext uri="{FF2B5EF4-FFF2-40B4-BE49-F238E27FC236}">
+                <a16:creationId xmlns:a16="http://schemas.microsoft.com/office/drawing/2014/main" id="{6D83C938-0A99-992D-F330-80A1E061E1D3}"/>
+              </a:ext>
+            </a:extLst>
+          </p:cNvPr>
+          <p:cNvSpPr txBox="1"/>
+          <p:nvPr/>
+        </p:nvSpPr>
+        <p:spPr>
+          <a:xfrm>
+            <a:off x="263352" y="3417019"/>
+            <a:ext cx="10729192" cy="338554"/>
+          </a:xfrm>
+          <a:prstGeom prst="rect">
+            <a:avLst/>
+          </a:prstGeom>
+          <a:noFill/>
+          <a:ln w="9525" cap="flat" cmpd="sng" algn="ctr">
+            <a:solidFill>
+              <a:schemeClr val="dk1"/>
+            </a:solidFill>
+            <a:prstDash val="solid"/>
+            <a:round/>
+            <a:headEnd type="none" w="med" len="med"/>
+            <a:tailEnd type="none" w="med" len="med"/>
+          </a:ln>
+        </p:spPr>
+        <p:style>
+          <a:lnRef idx="0">
+            <a:scrgbClr r="0" g="0" b="0"/>
+          </a:lnRef>
+          <a:fillRef idx="0">
+            <a:scrgbClr r="0" g="0" b="0"/>
+          </a:fillRef>
+          <a:effectRef idx="0">
+            <a:scrgbClr r="0" g="0" b="0"/>
+          </a:effectRef>
+          <a:fontRef idx="minor">
+            <a:schemeClr val="dk1"/>
+          </a:fontRef>
+        </p:style>
+        <p:txBody>
+          <a:bodyPr wrap="square">
+            <a:spAutoFit/>
+          </a:bodyPr>
+          <a:lstStyle/>
+          <a:p>
+            <a:r>
+              <a:rPr lang="de-DE" sz="1600" dirty="0"/>
+              <a:t>https://github.com/elixir-europe/biohackathon-projects-2023/blob/main/7/dumps/chemotion-datadump-2023-12-13.jsonld.gz</a:t>
+            </a:r>
+          </a:p>
+        </p:txBody>
+      </p:sp>
+      <p:sp>
+        <p:nvSpPr>
+          <p:cNvPr id="7" name="Textfeld 6">
+            <a:extLst>
+              <a:ext uri="{FF2B5EF4-FFF2-40B4-BE49-F238E27FC236}">
+                <a16:creationId xmlns:a16="http://schemas.microsoft.com/office/drawing/2014/main" id="{AA0AEC85-635E-8D3B-50A9-A4D6023B5FEB}"/>
+              </a:ext>
+            </a:extLst>
+          </p:cNvPr>
+          <p:cNvSpPr txBox="1"/>
+          <p:nvPr/>
+        </p:nvSpPr>
+        <p:spPr>
+          <a:xfrm>
+            <a:off x="263352" y="3932711"/>
+            <a:ext cx="10729192" cy="338554"/>
+          </a:xfrm>
+          <a:prstGeom prst="rect">
+            <a:avLst/>
+          </a:prstGeom>
+          <a:noFill/>
+          <a:ln w="9525" cap="flat" cmpd="sng" algn="ctr">
+            <a:solidFill>
+              <a:schemeClr val="dk1"/>
+            </a:solidFill>
+            <a:prstDash val="solid"/>
+            <a:round/>
+            <a:headEnd type="none" w="med" len="med"/>
+            <a:tailEnd type="none" w="med" len="med"/>
+          </a:ln>
+        </p:spPr>
+        <p:style>
+          <a:lnRef idx="0">
+            <a:scrgbClr r="0" g="0" b="0"/>
+          </a:lnRef>
+          <a:fillRef idx="0">
+            <a:scrgbClr r="0" g="0" b="0"/>
+          </a:fillRef>
+          <a:effectRef idx="0">
+            <a:scrgbClr r="0" g="0" b="0"/>
+          </a:effectRef>
+          <a:fontRef idx="minor">
+            <a:schemeClr val="dk1"/>
+          </a:fontRef>
+        </p:style>
+        <p:txBody>
+          <a:bodyPr wrap="square">
+            <a:spAutoFit/>
+          </a:bodyPr>
+          <a:lstStyle/>
+          <a:p>
+            <a:r>
+              <a:rPr lang="de-DE" sz="1600" dirty="0"/>
+              <a:t>https://github.com/FabianMauz/ipb-talk-postgres-jsonb-index</a:t>
             </a:r>
           </a:p>
         </p:txBody>
@@ -5130,42 +5246,6 @@
           </a:p>
         </p:txBody>
       </p:sp>
-      <p:pic>
-        <p:nvPicPr>
-          <p:cNvPr id="7" name="Grafik 6" descr="Ein Bild, das Diagramm, Text, Screenshot, Plan enthält.&#10;&#10;Automatisch generierte Beschreibung">
-            <a:extLst>
-              <a:ext uri="{FF2B5EF4-FFF2-40B4-BE49-F238E27FC236}">
-                <a16:creationId xmlns:a16="http://schemas.microsoft.com/office/drawing/2014/main" id="{FCBBDB9C-F5DC-F542-15B4-1162AF302F7D}"/>
-              </a:ext>
-            </a:extLst>
-          </p:cNvPr>
-          <p:cNvPicPr>
-            <a:picLocks noChangeAspect="1"/>
-          </p:cNvPicPr>
-          <p:nvPr/>
-        </p:nvPicPr>
-        <p:blipFill>
-          <a:blip r:embed="rId2">
-            <a:extLst>
-              <a:ext uri="{28A0092B-C50C-407E-A947-70E740481C1C}">
-                <a14:useLocalDpi xmlns:a14="http://schemas.microsoft.com/office/drawing/2010/main" val="0"/>
-              </a:ext>
-            </a:extLst>
-          </a:blip>
-          <a:stretch>
-            <a:fillRect/>
-          </a:stretch>
-        </p:blipFill>
-        <p:spPr>
-          <a:xfrm>
-            <a:off x="7248128" y="1268760"/>
-            <a:ext cx="4311558" cy="4841397"/>
-          </a:xfrm>
-          <a:prstGeom prst="rect">
-            <a:avLst/>
-          </a:prstGeom>
-        </p:spPr>
-      </p:pic>
       <p:sp>
         <p:nvSpPr>
           <p:cNvPr id="8" name="Textfeld 7">
@@ -5380,7 +5460,7 @@
             </a:r>
             <a:r>
               <a:rPr lang="en-US" altLang="de-DE" sz="1600" dirty="0"/>
-              <a:t>’);</a:t>
+              <a:t>');</a:t>
             </a:r>
           </a:p>
         </p:txBody>
@@ -5823,6 +5903,42 @@
           </a:p>
         </p:txBody>
       </p:sp>
+      <p:pic>
+        <p:nvPicPr>
+          <p:cNvPr id="6" name="Grafik 5" descr="Ein Bild, das Diagramm, Text, Screenshot, Plan enthält.&#10;&#10;Automatisch generierte Beschreibung">
+            <a:extLst>
+              <a:ext uri="{FF2B5EF4-FFF2-40B4-BE49-F238E27FC236}">
+                <a16:creationId xmlns:a16="http://schemas.microsoft.com/office/drawing/2014/main" id="{A66FEEDF-CEC1-62EC-BE1F-FA3995D5E08B}"/>
+              </a:ext>
+            </a:extLst>
+          </p:cNvPr>
+          <p:cNvPicPr>
+            <a:picLocks noChangeAspect="1"/>
+          </p:cNvPicPr>
+          <p:nvPr/>
+        </p:nvPicPr>
+        <p:blipFill>
+          <a:blip r:embed="rId2">
+            <a:extLst>
+              <a:ext uri="{28A0092B-C50C-407E-A947-70E740481C1C}">
+                <a14:useLocalDpi xmlns:a14="http://schemas.microsoft.com/office/drawing/2010/main" val="0"/>
+              </a:ext>
+            </a:extLst>
+          </a:blip>
+          <a:stretch>
+            <a:fillRect/>
+          </a:stretch>
+        </p:blipFill>
+        <p:spPr>
+          <a:xfrm>
+            <a:off x="7616195" y="1268760"/>
+            <a:ext cx="3943491" cy="4428098"/>
+          </a:xfrm>
+          <a:prstGeom prst="rect">
+            <a:avLst/>
+          </a:prstGeom>
+        </p:spPr>
+      </p:pic>
     </p:spTree>
     <p:extLst>
       <p:ext uri="{BB962C8B-B14F-4D97-AF65-F5344CB8AC3E}">
@@ -7471,7 +7587,7 @@
           <a:p>
             <a:r>
               <a:rPr lang="en-US" altLang="de-DE" sz="1600" i="1" dirty="0"/>
-              <a:t>SELECT id FROM metadata WHERE data @&gt; '{"identifier":"CRD-12627"}’;</a:t>
+              <a:t>SELECT id FROM metadata WHERE data @&gt; '{"identifier":"CRD-12627"}';</a:t>
             </a:r>
           </a:p>
         </p:txBody>
@@ -8010,7 +8126,7 @@
             </a:r>
             <a:r>
               <a:rPr lang="en-US" altLang="de-DE" sz="1600" dirty="0"/>
-              <a:t>' @&gt; '{"@id": "http://purl.obolibrary.org/obo/CHMO_0000596"}‘;</a:t>
+              <a:t>' @&gt; '{"@id": "http://purl.obolibrary.org/obo/CHMO_0000596"}';</a:t>
             </a:r>
             <a:endParaRPr lang="de-DE" altLang="de-DE" sz="1600" dirty="0"/>
           </a:p>
@@ -8293,7 +8409,7 @@
             </a:r>
             <a:r>
               <a:rPr lang="en-US" altLang="de-DE" sz="1600" dirty="0"/>
-              <a:t>’));</a:t>
+              <a:t>'));</a:t>
             </a:r>
           </a:p>
         </p:txBody>
@@ -9152,7 +9268,7 @@
             </a:r>
             <a:r>
               <a:rPr lang="de-DE" altLang="de-DE" sz="1600" dirty="0"/>
-              <a:t>-&gt;‘</a:t>
+              <a:t>-&gt;'</a:t>
             </a:r>
             <a:r>
               <a:rPr lang="de-DE" altLang="de-DE" sz="1600" dirty="0" err="1"/>

</xml_diff>

<commit_message>
add typos and btree index for = operator inside json
</commit_message>
<xml_diff>
--- a/20240530_postgres-indices.pptx
+++ b/20240530_postgres-indices.pptx
@@ -4092,7 +4092,7 @@
                   <a:schemeClr val="tx1"/>
                 </a:solidFill>
               </a:rPr>
-              <a:t>contraining</a:t>
+              <a:t>constraining</a:t>
             </a:r>
             <a:r>
               <a:rPr lang="de-DE" dirty="0">
@@ -6906,7 +6906,7 @@
         <p:spPr>
           <a:xfrm>
             <a:off x="767408" y="2661155"/>
-            <a:ext cx="4176464" cy="646331"/>
+            <a:ext cx="3744416" cy="646331"/>
           </a:xfrm>
           <a:prstGeom prst="rect">
             <a:avLst/>
@@ -6972,7 +6972,7 @@
                   <a:schemeClr val="tx1"/>
                 </a:solidFill>
               </a:rPr>
-              <a:t>eln</a:t>
+              <a:t>repository</a:t>
             </a:r>
             <a:r>
               <a:rPr lang="de-DE" altLang="de-DE" dirty="0">
@@ -6980,7 +6980,7 @@
                   <a:schemeClr val="tx1"/>
                 </a:solidFill>
               </a:rPr>
-              <a:t> </a:t>
+              <a:t>  </a:t>
             </a:r>
             <a:r>
               <a:rPr lang="de-DE" altLang="de-DE" dirty="0" err="1">
@@ -8581,7 +8581,7 @@
             </a:r>
             <a:r>
               <a:rPr lang="en-US" altLang="de-DE" sz="1600" dirty="0"/>
-              <a:t>' @&gt; '{"@id": "http://purl.obolibrary.org/obo/CHMO_0000596"}‘;</a:t>
+              <a:t>' @&gt; '{"@id": "http://purl.obolibrary.org/obo/CHMO_0000596"}';</a:t>
             </a:r>
             <a:endParaRPr lang="de-DE" altLang="de-DE" sz="1600" dirty="0"/>
           </a:p>
@@ -8654,7 +8654,7 @@
             </a:r>
             <a:r>
               <a:rPr lang="en-US" altLang="de-DE" sz="1600" dirty="0"/>
-              <a:t>'-&gt;&gt;'@id' = 'http://purl.obolibrary.org/obo/CHMO_0000596’; </a:t>
+              <a:t>'-&gt;&gt;'@id' = 'http://purl.obolibrary.org/obo/CHMO_0000596'; </a:t>
             </a:r>
           </a:p>
         </p:txBody>
@@ -8798,6 +8798,98 @@
                 </a:solidFill>
               </a:rPr>
               <a:t>used</a:t>
+            </a:r>
+            <a:endParaRPr lang="de-DE" dirty="0">
+              <a:solidFill>
+                <a:schemeClr val="tx1"/>
+              </a:solidFill>
+            </a:endParaRPr>
+          </a:p>
+        </p:txBody>
+      </p:sp>
+      <p:sp>
+        <p:nvSpPr>
+          <p:cNvPr id="6" name="Textfeld 5">
+            <a:extLst>
+              <a:ext uri="{FF2B5EF4-FFF2-40B4-BE49-F238E27FC236}">
+                <a16:creationId xmlns:a16="http://schemas.microsoft.com/office/drawing/2014/main" id="{ECCF23CB-668B-12BB-E4A9-590CE11F7D89}"/>
+              </a:ext>
+            </a:extLst>
+          </p:cNvPr>
+          <p:cNvSpPr txBox="1"/>
+          <p:nvPr/>
+        </p:nvSpPr>
+        <p:spPr>
+          <a:xfrm>
+            <a:off x="3707274" y="5374378"/>
+            <a:ext cx="1872208" cy="369332"/>
+          </a:xfrm>
+          <a:prstGeom prst="rect">
+            <a:avLst/>
+          </a:prstGeom>
+        </p:spPr>
+        <p:style>
+          <a:lnRef idx="2">
+            <a:schemeClr val="accent3">
+              <a:shade val="15000"/>
+            </a:schemeClr>
+          </a:lnRef>
+          <a:fillRef idx="1">
+            <a:schemeClr val="accent3"/>
+          </a:fillRef>
+          <a:effectRef idx="0">
+            <a:schemeClr val="accent3"/>
+          </a:effectRef>
+          <a:fontRef idx="minor">
+            <a:schemeClr val="lt1"/>
+          </a:fontRef>
+        </p:style>
+        <p:txBody>
+          <a:bodyPr wrap="square" rtlCol="0">
+            <a:spAutoFit/>
+          </a:bodyPr>
+          <a:lstStyle/>
+          <a:p>
+            <a:pPr algn="ctr"/>
+            <a:r>
+              <a:rPr lang="de-DE" dirty="0" err="1">
+                <a:solidFill>
+                  <a:schemeClr val="tx1"/>
+                </a:solidFill>
+              </a:rPr>
+              <a:t>Btree</a:t>
+            </a:r>
+            <a:r>
+              <a:rPr lang="de-DE" dirty="0">
+                <a:solidFill>
+                  <a:schemeClr val="tx1"/>
+                </a:solidFill>
+              </a:rPr>
+              <a:t> </a:t>
+            </a:r>
+            <a:r>
+              <a:rPr lang="de-DE" dirty="0" err="1">
+                <a:solidFill>
+                  <a:schemeClr val="tx1"/>
+                </a:solidFill>
+              </a:rPr>
+              <a:t>index</a:t>
+            </a:r>
+            <a:r>
+              <a:rPr lang="de-DE" dirty="0">
+                <a:solidFill>
+                  <a:schemeClr val="tx1"/>
+                </a:solidFill>
+              </a:rPr>
+              <a:t> </a:t>
+            </a:r>
+            <a:r>
+              <a:rPr lang="de-DE" dirty="0" err="1">
+                <a:solidFill>
+                  <a:schemeClr val="tx1"/>
+                </a:solidFill>
+              </a:rPr>
+              <a:t>works</a:t>
             </a:r>
             <a:endParaRPr lang="de-DE" dirty="0">
               <a:solidFill>

</xml_diff>

<commit_message>
add btree index sql query for example 2
</commit_message>
<xml_diff>
--- a/20240530_postgres-indices.pptx
+++ b/20240530_postgres-indices.pptx
@@ -8428,7 +8428,7 @@
         </p:nvSpPr>
         <p:spPr>
           <a:xfrm>
-            <a:off x="9391265" y="3512556"/>
+            <a:off x="9336360" y="3228804"/>
             <a:ext cx="1872208" cy="646331"/>
           </a:xfrm>
           <a:prstGeom prst="rect">
@@ -8601,7 +8601,7 @@
         </p:nvSpPr>
         <p:spPr>
           <a:xfrm>
-            <a:off x="278875" y="4753819"/>
+            <a:off x="263352" y="4234712"/>
             <a:ext cx="8928992" cy="584775"/>
           </a:xfrm>
           <a:prstGeom prst="rect">
@@ -8673,7 +8673,7 @@
         </p:nvSpPr>
         <p:spPr>
           <a:xfrm>
-            <a:off x="8993118" y="4988409"/>
+            <a:off x="8993118" y="4404644"/>
             <a:ext cx="2414675" cy="646331"/>
           </a:xfrm>
           <a:prstGeom prst="rect">
@@ -8821,7 +8821,7 @@
         </p:nvSpPr>
         <p:spPr>
           <a:xfrm>
-            <a:off x="3707274" y="5374378"/>
+            <a:off x="9840416" y="5269249"/>
             <a:ext cx="1872208" cy="369332"/>
           </a:xfrm>
           <a:prstGeom prst="rect">
@@ -8896,6 +8896,80 @@
                 <a:schemeClr val="tx1"/>
               </a:solidFill>
             </a:endParaRPr>
+          </a:p>
+        </p:txBody>
+      </p:sp>
+      <p:sp>
+        <p:nvSpPr>
+          <p:cNvPr id="10" name="Textfeld 9">
+            <a:extLst>
+              <a:ext uri="{FF2B5EF4-FFF2-40B4-BE49-F238E27FC236}">
+                <a16:creationId xmlns:a16="http://schemas.microsoft.com/office/drawing/2014/main" id="{80BD86F2-B770-A938-FDA4-5681DB0F724D}"/>
+              </a:ext>
+            </a:extLst>
+          </p:cNvPr>
+          <p:cNvSpPr txBox="1"/>
+          <p:nvPr/>
+        </p:nvSpPr>
+        <p:spPr>
+          <a:xfrm>
+            <a:off x="263352" y="5501556"/>
+            <a:ext cx="9474740" cy="338554"/>
+          </a:xfrm>
+          <a:prstGeom prst="rect">
+            <a:avLst/>
+          </a:prstGeom>
+          <a:noFill/>
+          <a:ln w="9525" cap="flat" cmpd="sng" algn="ctr">
+            <a:solidFill>
+              <a:schemeClr val="dk1"/>
+            </a:solidFill>
+            <a:prstDash val="solid"/>
+            <a:round/>
+            <a:headEnd type="none" w="med" len="med"/>
+            <a:tailEnd type="none" w="med" len="med"/>
+          </a:ln>
+        </p:spPr>
+        <p:style>
+          <a:lnRef idx="0">
+            <a:scrgbClr r="0" g="0" b="0"/>
+          </a:lnRef>
+          <a:fillRef idx="0">
+            <a:scrgbClr r="0" g="0" b="0"/>
+          </a:fillRef>
+          <a:effectRef idx="0">
+            <a:scrgbClr r="0" g="0" b="0"/>
+          </a:effectRef>
+          <a:fontRef idx="minor">
+            <a:schemeClr val="dk1"/>
+          </a:fontRef>
+        </p:style>
+        <p:txBody>
+          <a:bodyPr wrap="square">
+            <a:spAutoFit/>
+          </a:bodyPr>
+          <a:lstStyle/>
+          <a:p>
+            <a:r>
+              <a:rPr lang="en-US" altLang="de-DE" sz="1600" dirty="0"/>
+              <a:t>CREATE INDEX </a:t>
+            </a:r>
+            <a:r>
+              <a:rPr lang="en-US" altLang="de-DE" sz="1600" dirty="0" err="1"/>
+              <a:t>index_on_measurement_id</a:t>
+            </a:r>
+            <a:r>
+              <a:rPr lang="en-US" altLang="de-DE" sz="1600" dirty="0"/>
+              <a:t> ON metadata using BTREE((data-&gt;'</a:t>
+            </a:r>
+            <a:r>
+              <a:rPr lang="en-US" altLang="de-DE" sz="1600" dirty="0" err="1"/>
+              <a:t>measurementTechnique</a:t>
+            </a:r>
+            <a:r>
+              <a:rPr lang="en-US" altLang="de-DE" sz="1600" dirty="0"/>
+              <a:t>'-&gt;&gt;'@id'));</a:t>
+            </a:r>
           </a:p>
         </p:txBody>
       </p:sp>
@@ -9254,53 +9328,6 @@
       </p:sp>
       <p:sp>
         <p:nvSpPr>
-          <p:cNvPr id="7" name="Textfeld 6">
-            <a:extLst>
-              <a:ext uri="{FF2B5EF4-FFF2-40B4-BE49-F238E27FC236}">
-                <a16:creationId xmlns:a16="http://schemas.microsoft.com/office/drawing/2014/main" id="{701E0507-067E-42DE-CC00-0C53CD3B986A}"/>
-              </a:ext>
-            </a:extLst>
-          </p:cNvPr>
-          <p:cNvSpPr txBox="1"/>
-          <p:nvPr/>
-        </p:nvSpPr>
-        <p:spPr>
-          <a:xfrm>
-            <a:off x="3806264" y="4133811"/>
-            <a:ext cx="1872208" cy="369332"/>
-          </a:xfrm>
-          <a:prstGeom prst="rect">
-            <a:avLst/>
-          </a:prstGeom>
-          <a:noFill/>
-        </p:spPr>
-        <p:txBody>
-          <a:bodyPr wrap="square" rtlCol="0">
-            <a:spAutoFit/>
-          </a:bodyPr>
-          <a:lstStyle/>
-          <a:p>
-            <a:r>
-              <a:rPr lang="de-DE" dirty="0" err="1"/>
-              <a:t>No</a:t>
-            </a:r>
-            <a:r>
-              <a:rPr lang="de-DE" dirty="0"/>
-              <a:t> </a:t>
-            </a:r>
-            <a:r>
-              <a:rPr lang="de-DE" dirty="0" err="1"/>
-              <a:t>changes</a:t>
-            </a:r>
-            <a:r>
-              <a:rPr lang="de-DE" dirty="0"/>
-              <a:t> !!! </a:t>
-            </a:r>
-          </a:p>
-        </p:txBody>
-      </p:sp>
-      <p:sp>
-        <p:nvSpPr>
           <p:cNvPr id="4" name="Textfeld 3">
             <a:extLst>
               <a:ext uri="{FF2B5EF4-FFF2-40B4-BE49-F238E27FC236}">
@@ -9455,7 +9482,7 @@
         </p:nvSpPr>
         <p:spPr>
           <a:xfrm>
-            <a:off x="9422356" y="1962275"/>
+            <a:off x="9264352" y="1843082"/>
             <a:ext cx="1872208" cy="646331"/>
           </a:xfrm>
           <a:prstGeom prst="rect">
@@ -9652,6 +9679,273 @@
               <a:rPr lang="de-DE" sz="1600" dirty="0"/>
               <a:t>'));</a:t>
             </a:r>
+          </a:p>
+        </p:txBody>
+      </p:sp>
+      <p:sp>
+        <p:nvSpPr>
+          <p:cNvPr id="2" name="Textfeld 1">
+            <a:extLst>
+              <a:ext uri="{FF2B5EF4-FFF2-40B4-BE49-F238E27FC236}">
+                <a16:creationId xmlns:a16="http://schemas.microsoft.com/office/drawing/2014/main" id="{79649BA0-6FAE-1280-4309-6E2CCB19317E}"/>
+              </a:ext>
+            </a:extLst>
+          </p:cNvPr>
+          <p:cNvSpPr txBox="1"/>
+          <p:nvPr/>
+        </p:nvSpPr>
+        <p:spPr>
+          <a:xfrm>
+            <a:off x="263352" y="3818812"/>
+            <a:ext cx="8928992" cy="338554"/>
+          </a:xfrm>
+          <a:prstGeom prst="rect">
+            <a:avLst/>
+          </a:prstGeom>
+          <a:noFill/>
+          <a:ln w="9525" cap="flat" cmpd="sng" algn="ctr">
+            <a:solidFill>
+              <a:schemeClr val="dk1"/>
+            </a:solidFill>
+            <a:prstDash val="solid"/>
+            <a:round/>
+            <a:headEnd type="none" w="med" len="med"/>
+            <a:tailEnd type="none" w="med" len="med"/>
+          </a:ln>
+        </p:spPr>
+        <p:style>
+          <a:lnRef idx="0">
+            <a:scrgbClr r="0" g="0" b="0"/>
+          </a:lnRef>
+          <a:fillRef idx="0">
+            <a:scrgbClr r="0" g="0" b="0"/>
+          </a:fillRef>
+          <a:effectRef idx="0">
+            <a:scrgbClr r="0" g="0" b="0"/>
+          </a:effectRef>
+          <a:fontRef idx="minor">
+            <a:schemeClr val="dk1"/>
+          </a:fontRef>
+        </p:style>
+        <p:txBody>
+          <a:bodyPr wrap="square">
+            <a:spAutoFit/>
+          </a:bodyPr>
+          <a:lstStyle/>
+          <a:p>
+            <a:r>
+              <a:rPr lang="en-US" sz="1600" dirty="0"/>
+              <a:t>CREATE INDEX </a:t>
+            </a:r>
+            <a:r>
+              <a:rPr lang="en-US" sz="1600" dirty="0" err="1"/>
+              <a:t>index_on_author_name</a:t>
+            </a:r>
+            <a:r>
+              <a:rPr lang="en-US" sz="1600" dirty="0"/>
+              <a:t> ON metadata using BTREE((data-&gt;'author'-&gt;&gt;'name'));</a:t>
+            </a:r>
+            <a:endParaRPr lang="de-DE" sz="1600" dirty="0"/>
+          </a:p>
+        </p:txBody>
+      </p:sp>
+      <p:sp>
+        <p:nvSpPr>
+          <p:cNvPr id="6" name="Textfeld 5">
+            <a:extLst>
+              <a:ext uri="{FF2B5EF4-FFF2-40B4-BE49-F238E27FC236}">
+                <a16:creationId xmlns:a16="http://schemas.microsoft.com/office/drawing/2014/main" id="{D4D8989C-55D1-A013-F49B-149E84216C49}"/>
+              </a:ext>
+            </a:extLst>
+          </p:cNvPr>
+          <p:cNvSpPr txBox="1"/>
+          <p:nvPr/>
+        </p:nvSpPr>
+        <p:spPr>
+          <a:xfrm>
+            <a:off x="9264352" y="2924634"/>
+            <a:ext cx="1872208" cy="369332"/>
+          </a:xfrm>
+          <a:prstGeom prst="rect">
+            <a:avLst/>
+          </a:prstGeom>
+        </p:spPr>
+        <p:style>
+          <a:lnRef idx="2">
+            <a:schemeClr val="accent3">
+              <a:shade val="15000"/>
+            </a:schemeClr>
+          </a:lnRef>
+          <a:fillRef idx="1">
+            <a:schemeClr val="accent3"/>
+          </a:fillRef>
+          <a:effectRef idx="0">
+            <a:schemeClr val="accent3"/>
+          </a:effectRef>
+          <a:fontRef idx="minor">
+            <a:schemeClr val="lt1"/>
+          </a:fontRef>
+        </p:style>
+        <p:txBody>
+          <a:bodyPr wrap="square" rtlCol="0">
+            <a:spAutoFit/>
+          </a:bodyPr>
+          <a:lstStyle/>
+          <a:p>
+            <a:pPr algn="ctr"/>
+            <a:r>
+              <a:rPr lang="de-DE" dirty="0">
+                <a:solidFill>
+                  <a:schemeClr val="tx1"/>
+                </a:solidFill>
+              </a:rPr>
+              <a:t>Still </a:t>
+            </a:r>
+            <a:r>
+              <a:rPr lang="de-DE" dirty="0" err="1">
+                <a:solidFill>
+                  <a:schemeClr val="tx1"/>
+                </a:solidFill>
+              </a:rPr>
+              <a:t>full</a:t>
+            </a:r>
+            <a:r>
+              <a:rPr lang="de-DE" dirty="0">
+                <a:solidFill>
+                  <a:schemeClr val="tx1"/>
+                </a:solidFill>
+              </a:rPr>
+              <a:t> </a:t>
+            </a:r>
+            <a:r>
+              <a:rPr lang="de-DE" dirty="0" err="1">
+                <a:solidFill>
+                  <a:schemeClr val="tx1"/>
+                </a:solidFill>
+              </a:rPr>
+              <a:t>table</a:t>
+            </a:r>
+            <a:r>
+              <a:rPr lang="de-DE" dirty="0">
+                <a:solidFill>
+                  <a:schemeClr val="tx1"/>
+                </a:solidFill>
+              </a:rPr>
+              <a:t> </a:t>
+            </a:r>
+            <a:r>
+              <a:rPr lang="de-DE" dirty="0" err="1">
+                <a:solidFill>
+                  <a:schemeClr val="tx1"/>
+                </a:solidFill>
+              </a:rPr>
+              <a:t>scan</a:t>
+            </a:r>
+            <a:endParaRPr lang="de-DE" dirty="0">
+              <a:solidFill>
+                <a:schemeClr val="tx1"/>
+              </a:solidFill>
+            </a:endParaRPr>
+          </a:p>
+        </p:txBody>
+      </p:sp>
+      <p:sp>
+        <p:nvSpPr>
+          <p:cNvPr id="13" name="Textfeld 12">
+            <a:extLst>
+              <a:ext uri="{FF2B5EF4-FFF2-40B4-BE49-F238E27FC236}">
+                <a16:creationId xmlns:a16="http://schemas.microsoft.com/office/drawing/2014/main" id="{41A0F6B4-207E-50EB-E839-FA6787520CA7}"/>
+              </a:ext>
+            </a:extLst>
+          </p:cNvPr>
+          <p:cNvSpPr txBox="1"/>
+          <p:nvPr/>
+        </p:nvSpPr>
+        <p:spPr>
+          <a:xfrm>
+            <a:off x="9264352" y="3788034"/>
+            <a:ext cx="1872208" cy="369332"/>
+          </a:xfrm>
+          <a:prstGeom prst="rect">
+            <a:avLst/>
+          </a:prstGeom>
+        </p:spPr>
+        <p:style>
+          <a:lnRef idx="2">
+            <a:schemeClr val="accent3">
+              <a:shade val="15000"/>
+            </a:schemeClr>
+          </a:lnRef>
+          <a:fillRef idx="1">
+            <a:schemeClr val="accent3"/>
+          </a:fillRef>
+          <a:effectRef idx="0">
+            <a:schemeClr val="accent3"/>
+          </a:effectRef>
+          <a:fontRef idx="minor">
+            <a:schemeClr val="lt1"/>
+          </a:fontRef>
+        </p:style>
+        <p:txBody>
+          <a:bodyPr wrap="square" rtlCol="0">
+            <a:spAutoFit/>
+          </a:bodyPr>
+          <a:lstStyle/>
+          <a:p>
+            <a:pPr algn="ctr"/>
+            <a:r>
+              <a:rPr lang="de-DE" dirty="0">
+                <a:solidFill>
+                  <a:schemeClr val="tx1"/>
+                </a:solidFill>
+              </a:rPr>
+              <a:t>Still </a:t>
+            </a:r>
+            <a:r>
+              <a:rPr lang="de-DE" dirty="0" err="1">
+                <a:solidFill>
+                  <a:schemeClr val="tx1"/>
+                </a:solidFill>
+              </a:rPr>
+              <a:t>full</a:t>
+            </a:r>
+            <a:r>
+              <a:rPr lang="de-DE" dirty="0">
+                <a:solidFill>
+                  <a:schemeClr val="tx1"/>
+                </a:solidFill>
+              </a:rPr>
+              <a:t> </a:t>
+            </a:r>
+            <a:r>
+              <a:rPr lang="de-DE" dirty="0" err="1">
+                <a:solidFill>
+                  <a:schemeClr val="tx1"/>
+                </a:solidFill>
+              </a:rPr>
+              <a:t>table</a:t>
+            </a:r>
+            <a:r>
+              <a:rPr lang="de-DE" dirty="0">
+                <a:solidFill>
+                  <a:schemeClr val="tx1"/>
+                </a:solidFill>
+              </a:rPr>
+              <a:t> </a:t>
+            </a:r>
+            <a:r>
+              <a:rPr lang="de-DE" dirty="0" err="1">
+                <a:solidFill>
+                  <a:schemeClr val="tx1"/>
+                </a:solidFill>
+              </a:rPr>
+              <a:t>scan</a:t>
+            </a:r>
+            <a:endParaRPr lang="de-DE" dirty="0">
+              <a:solidFill>
+                <a:schemeClr val="tx1"/>
+              </a:solidFill>
+            </a:endParaRPr>
           </a:p>
         </p:txBody>
       </p:sp>

</xml_diff>